<commit_message>
link to node version too
</commit_message>
<xml_diff>
--- a/slides.pptx
+++ b/slides.pptx
@@ -17056,9 +17056,7 @@
             <a:r>
               <a:rPr lang="en-US" sz="2400" dirty="0">
                 <a:solidFill>
-                  <a:schemeClr val="bg1">
-                    <a:lumMod val="50000"/>
-                  </a:schemeClr>
+                  <a:srgbClr val="384AF0"/>
                 </a:solidFill>
                 <a:latin typeface="Arial" panose="020B0604020202020204" pitchFamily="34" charset="0"/>
                 <a:cs typeface="Arial" panose="020B0604020202020204" pitchFamily="34" charset="0"/>
@@ -19605,7 +19603,7 @@
                   <a:latin typeface="Arial" panose="020B0604020202020204" pitchFamily="34" charset="0"/>
                   <a:cs typeface="Arial" panose="020B0604020202020204" pitchFamily="34" charset="0"/>
                 </a:rPr>
-                <a:t>encrypt(                            )( )</a:t>
+                <a:t>encrypt(                           )( )</a:t>
               </a:r>
             </a:p>
           </p:txBody>

</xml_diff>